<commit_message>
Template Update + Misc
</commit_message>
<xml_diff>
--- a/Presentations/70-534-Template.pptx
+++ b/Presentations/70-534-Template.pptx
@@ -124,10 +124,6 @@
     </p:ext>
   </p:extLst>
 </p:presentation>
-</file>
-
-<file path=ppt/revisionInfo.xml><?xml version="1.0" encoding="utf-8"?>
-<p1510:revInfo xmlns:a="http://schemas.openxmlformats.org/drawingml/2006/main" xmlns:r="http://schemas.openxmlformats.org/officeDocument/2006/relationships" xmlns:p1510="http://schemas.microsoft.com/office/powerpoint/2015/10/main"/>
 </file>
 
 <file path=ppt/diagrams/colors1.xml><?xml version="1.0" encoding="utf-8"?>
@@ -3879,7 +3875,7 @@
           <a:p>
             <a:fld id="{20BFA10A-2189-4747-94AC-E60B434EC1C1}" type="datetimeFigureOut">
               <a:rPr lang="en-US" smtClean="0"/>
-              <a:t>6/10/2017</a:t>
+              <a:t>6/11/2017</a:t>
             </a:fld>
             <a:endParaRPr lang="en-US"/>
           </a:p>
@@ -4450,7 +4446,7 @@
                 <a:tabLst/>
                 <a:defRPr/>
               </a:pPr>
-              <a:t>6/10/2017</a:t>
+              <a:t>6/11/2017</a:t>
             </a:fld>
             <a:endParaRPr kumimoji="0" lang="en-US" sz="1200" b="0" i="0" u="none" strike="noStrike" kern="1200" cap="none" spc="0" normalizeH="0" baseline="0" noProof="0" dirty="0">
               <a:ln>
@@ -4566,7 +4562,7 @@
 </file>
 
 <file path=ppt/slideLayouts/slideLayout1.xml><?xml version="1.0" encoding="utf-8"?>
-<p:sldLayout xmlns:a="http://schemas.openxmlformats.org/drawingml/2006/main" xmlns:r="http://schemas.openxmlformats.org/officeDocument/2006/relationships" xmlns:p="http://schemas.openxmlformats.org/presentationml/2006/main" type="obj" preserve="1">
+<p:sldLayout xmlns:a="http://schemas.openxmlformats.org/drawingml/2006/main" xmlns:r="http://schemas.openxmlformats.org/officeDocument/2006/relationships" xmlns:p="http://schemas.openxmlformats.org/presentationml/2006/main" preserve="1" userDrawn="1">
   <p:cSld name="Lab">
     <p:bg>
       <p:bgPr>
@@ -4675,7 +4671,7 @@
             <a:pPr lvl="0"/>
             <a:r>
               <a:rPr lang="en-US" dirty="0"/>
-              <a:t>Click to edit Master text styles</a:t>
+              <a:t>Click to edit Master text</a:t>
             </a:r>
           </a:p>
           <a:p>
@@ -4744,61 +4740,152 @@
       </p:sp>
       <p:sp>
         <p:nvSpPr>
-          <p:cNvPr id="9" name="Title 1">
+          <p:cNvPr id="6" name="TextBox 5">
             <a:extLst>
               <a:ext uri="{FF2B5EF4-FFF2-40B4-BE49-F238E27FC236}">
-                <a16:creationId xmlns:a16="http://schemas.microsoft.com/office/drawing/2014/main" id="{C610877B-30C7-48C5-8BDA-CA0DB0C7F805}"/>
+                <a16:creationId xmlns:a16="http://schemas.microsoft.com/office/drawing/2014/main" id="{2DFD4B7A-BDF0-4AB3-85B3-B66838F8DF47}"/>
               </a:ext>
             </a:extLst>
           </p:cNvPr>
-          <p:cNvSpPr txBox="1">
-            <a:spLocks/>
-          </p:cNvSpPr>
+          <p:cNvSpPr txBox="1"/>
           <p:nvPr userDrawn="1"/>
         </p:nvSpPr>
         <p:spPr>
           <a:xfrm>
-            <a:off x="201591" y="6219371"/>
-            <a:ext cx="11778205" cy="587829"/>
+            <a:off x="9315938" y="5823048"/>
+            <a:ext cx="2782277" cy="369332"/>
           </a:xfrm>
           <a:prstGeom prst="rect">
             <a:avLst/>
           </a:prstGeom>
+          <a:noFill/>
+        </p:spPr>
+        <p:txBody>
+          <a:bodyPr wrap="square" rtlCol="0">
+            <a:spAutoFit/>
+          </a:bodyPr>
+          <a:lstStyle/>
+          <a:p>
+            <a:r>
+              <a:rPr lang="en-US" sz="1000" dirty="0"/>
+              <a:t>Socialize: </a:t>
+            </a:r>
+            <a:r>
+              <a:rPr lang="en-US" dirty="0"/>
+              <a:t>#70-534 @ITProGuru</a:t>
+            </a:r>
+          </a:p>
+        </p:txBody>
+      </p:sp>
+      <p:sp>
+        <p:nvSpPr>
+          <p:cNvPr id="5" name="Text Placeholder 4">
+            <a:extLst>
+              <a:ext uri="{FF2B5EF4-FFF2-40B4-BE49-F238E27FC236}">
+                <a16:creationId xmlns:a16="http://schemas.microsoft.com/office/drawing/2014/main" id="{A77509F3-A06B-4F9A-B875-C7550AA0D853}"/>
+              </a:ext>
+            </a:extLst>
+          </p:cNvPr>
+          <p:cNvSpPr>
+            <a:spLocks noGrp="1"/>
+          </p:cNvSpPr>
+          <p:nvPr>
+            <p:ph type="body" sz="quarter" idx="10" hasCustomPrompt="1"/>
+          </p:nvPr>
+        </p:nvSpPr>
+        <p:spPr>
+          <a:xfrm>
+            <a:off x="211138" y="6206895"/>
+            <a:ext cx="11768137" cy="603708"/>
+          </a:xfrm>
           <a:solidFill>
-            <a:schemeClr val="bg1"/>
+            <a:srgbClr val="FFF2CC"/>
           </a:solidFill>
         </p:spPr>
         <p:txBody>
-          <a:bodyPr vert="horz" lIns="91440" tIns="45720" rIns="91440" bIns="45720" rtlCol="0" anchor="ctr">
+          <a:bodyPr>
             <a:noAutofit/>
           </a:bodyPr>
           <a:lstStyle>
-            <a:lvl1pPr algn="l" defTabSz="914400" rtl="0" eaLnBrk="1" latinLnBrk="0" hangingPunct="1">
-              <a:lnSpc>
-                <a:spcPct val="90000"/>
-              </a:lnSpc>
-              <a:spcBef>
-                <a:spcPct val="0"/>
-              </a:spcBef>
-              <a:buNone/>
-              <a:defRPr sz="4400" kern="1200">
-                <a:solidFill>
-                  <a:schemeClr val="tx1"/>
-                </a:solidFill>
-                <a:latin typeface="+mj-lt"/>
-                <a:ea typeface="+mj-ea"/>
-                <a:cs typeface="+mj-cs"/>
-              </a:defRPr>
-            </a:lvl1pPr>
-          </a:lstStyle>
-          <a:p>
-            <a:r>
-              <a:rPr lang="en-US" sz="2000" u="sng" dirty="0">
+            <a:lvl1pPr marL="0" indent="0">
+              <a:buFontTx/>
+              <a:buNone/>
+              <a:defRPr sz="1800" u="sng">
                 <a:solidFill>
                   <a:srgbClr val="0070C0"/>
                 </a:solidFill>
-              </a:rPr>
-              <a:t>Click to edit Lab URL</a:t>
+              </a:defRPr>
+            </a:lvl1pPr>
+            <a:lvl2pPr marL="457200" indent="0">
+              <a:buFontTx/>
+              <a:buNone/>
+              <a:defRPr sz="1800" u="sng">
+                <a:solidFill>
+                  <a:srgbClr val="0070C0"/>
+                </a:solidFill>
+              </a:defRPr>
+            </a:lvl2pPr>
+            <a:lvl3pPr marL="914400" indent="0">
+              <a:buFontTx/>
+              <a:buNone/>
+              <a:defRPr sz="1800" u="sng">
+                <a:solidFill>
+                  <a:srgbClr val="0070C0"/>
+                </a:solidFill>
+              </a:defRPr>
+            </a:lvl3pPr>
+            <a:lvl4pPr marL="1371600" indent="0">
+              <a:buFontTx/>
+              <a:buNone/>
+              <a:defRPr sz="1800" u="sng">
+                <a:solidFill>
+                  <a:srgbClr val="0070C0"/>
+                </a:solidFill>
+              </a:defRPr>
+            </a:lvl4pPr>
+            <a:lvl5pPr marL="1828800" indent="0">
+              <a:buFontTx/>
+              <a:buNone/>
+              <a:defRPr sz="1800" u="sng">
+                <a:solidFill>
+                  <a:srgbClr val="0070C0"/>
+                </a:solidFill>
+              </a:defRPr>
+            </a:lvl5pPr>
+          </a:lstStyle>
+          <a:p>
+            <a:pPr lvl="0"/>
+            <a:r>
+              <a:rPr lang="en-US" dirty="0"/>
+              <a:t>Edit Lab URL</a:t>
+            </a:r>
+          </a:p>
+          <a:p>
+            <a:pPr lvl="1"/>
+            <a:r>
+              <a:rPr lang="en-US" dirty="0"/>
+              <a:t>Second level</a:t>
+            </a:r>
+          </a:p>
+          <a:p>
+            <a:pPr lvl="2"/>
+            <a:r>
+              <a:rPr lang="en-US" dirty="0"/>
+              <a:t>Third level</a:t>
+            </a:r>
+          </a:p>
+          <a:p>
+            <a:pPr lvl="3"/>
+            <a:r>
+              <a:rPr lang="en-US" dirty="0"/>
+              <a:t>Fourth level</a:t>
+            </a:r>
+          </a:p>
+          <a:p>
+            <a:pPr lvl="4"/>
+            <a:r>
+              <a:rPr lang="en-US" dirty="0"/>
+              <a:t>Fifth level</a:t>
             </a:r>
           </a:p>
         </p:txBody>
@@ -4974,71 +5061,6 @@
           </a:p>
         </p:txBody>
       </p:sp>
-      <p:sp>
-        <p:nvSpPr>
-          <p:cNvPr id="5" name="Date Placeholder 4"/>
-          <p:cNvSpPr>
-            <a:spLocks noGrp="1"/>
-          </p:cNvSpPr>
-          <p:nvPr>
-            <p:ph type="dt" sz="half" idx="10"/>
-          </p:nvPr>
-        </p:nvSpPr>
-        <p:spPr/>
-        <p:txBody>
-          <a:bodyPr/>
-          <a:lstStyle/>
-          <a:p>
-            <a:fld id="{C764DE79-268F-4C1A-8933-263129D2AF90}" type="datetimeFigureOut">
-              <a:rPr lang="en-US" dirty="0"/>
-              <a:t>6/10/2017</a:t>
-            </a:fld>
-            <a:endParaRPr lang="en-US" dirty="0"/>
-          </a:p>
-        </p:txBody>
-      </p:sp>
-      <p:sp>
-        <p:nvSpPr>
-          <p:cNvPr id="6" name="Footer Placeholder 5"/>
-          <p:cNvSpPr>
-            <a:spLocks noGrp="1"/>
-          </p:cNvSpPr>
-          <p:nvPr>
-            <p:ph type="ftr" sz="quarter" idx="11"/>
-          </p:nvPr>
-        </p:nvSpPr>
-        <p:spPr/>
-        <p:txBody>
-          <a:bodyPr/>
-          <a:lstStyle/>
-          <a:p>
-            <a:endParaRPr lang="en-US" dirty="0"/>
-          </a:p>
-        </p:txBody>
-      </p:sp>
-      <p:sp>
-        <p:nvSpPr>
-          <p:cNvPr id="7" name="Slide Number Placeholder 6"/>
-          <p:cNvSpPr>
-            <a:spLocks noGrp="1"/>
-          </p:cNvSpPr>
-          <p:nvPr>
-            <p:ph type="sldNum" sz="quarter" idx="12"/>
-          </p:nvPr>
-        </p:nvSpPr>
-        <p:spPr/>
-        <p:txBody>
-          <a:bodyPr/>
-          <a:lstStyle/>
-          <a:p>
-            <a:fld id="{48F63A3B-78C7-47BE-AE5E-E10140E04643}" type="slidenum">
-              <a:rPr lang="en-US" dirty="0"/>
-              <a:t>‹#›</a:t>
-            </a:fld>
-            <a:endParaRPr lang="en-US" dirty="0"/>
-          </a:p>
-        </p:txBody>
-      </p:sp>
     </p:spTree>
     <p:extLst>
       <p:ext uri="{BB962C8B-B14F-4D97-AF65-F5344CB8AC3E}">
@@ -5278,7 +5300,7 @@
           <a:p>
             <a:pPr lvl="0"/>
             <a:r>
-              <a:rPr lang="en-US"/>
+              <a:rPr lang="en-US" dirty="0"/>
               <a:t>Click to edit Master text styles</a:t>
             </a:r>
           </a:p>
@@ -5351,14 +5373,22 @@
             <p:ph type="dt" sz="half" idx="10"/>
           </p:nvPr>
         </p:nvSpPr>
-        <p:spPr/>
+        <p:spPr>
+          <a:xfrm>
+            <a:off x="838200" y="6356350"/>
+            <a:ext cx="2743200" cy="365125"/>
+          </a:xfrm>
+          <a:prstGeom prst="rect">
+            <a:avLst/>
+          </a:prstGeom>
+        </p:spPr>
         <p:txBody>
           <a:bodyPr/>
           <a:lstStyle/>
           <a:p>
             <a:fld id="{C764DE79-268F-4C1A-8933-263129D2AF90}" type="datetimeFigureOut">
               <a:rPr lang="en-US" dirty="0"/>
-              <a:t>6/10/2017</a:t>
+              <a:t>6/11/2017</a:t>
             </a:fld>
             <a:endParaRPr lang="en-US" dirty="0"/>
           </a:p>
@@ -5374,7 +5404,15 @@
             <p:ph type="ftr" sz="quarter" idx="11"/>
           </p:nvPr>
         </p:nvSpPr>
-        <p:spPr/>
+        <p:spPr>
+          <a:xfrm>
+            <a:off x="4038600" y="6356350"/>
+            <a:ext cx="4114800" cy="365125"/>
+          </a:xfrm>
+          <a:prstGeom prst="rect">
+            <a:avLst/>
+          </a:prstGeom>
+        </p:spPr>
         <p:txBody>
           <a:bodyPr/>
           <a:lstStyle/>
@@ -5393,7 +5431,15 @@
             <p:ph type="sldNum" sz="quarter" idx="12"/>
           </p:nvPr>
         </p:nvSpPr>
-        <p:spPr/>
+        <p:spPr>
+          <a:xfrm>
+            <a:off x="8610600" y="6356350"/>
+            <a:ext cx="689708" cy="365125"/>
+          </a:xfrm>
+          <a:prstGeom prst="rect">
+            <a:avLst/>
+          </a:prstGeom>
+        </p:spPr>
         <p:txBody>
           <a:bodyPr/>
           <a:lstStyle/>
@@ -5479,14 +5525,22 @@
             <p:ph type="dt" sz="half" idx="10"/>
           </p:nvPr>
         </p:nvSpPr>
-        <p:spPr/>
+        <p:spPr>
+          <a:xfrm>
+            <a:off x="838200" y="6356350"/>
+            <a:ext cx="2743200" cy="365125"/>
+          </a:xfrm>
+          <a:prstGeom prst="rect">
+            <a:avLst/>
+          </a:prstGeom>
+        </p:spPr>
         <p:txBody>
           <a:bodyPr/>
           <a:lstStyle/>
           <a:p>
             <a:fld id="{C764DE79-268F-4C1A-8933-263129D2AF90}" type="datetimeFigureOut">
               <a:rPr lang="en-US" dirty="0"/>
-              <a:t>6/10/2017</a:t>
+              <a:t>6/11/2017</a:t>
             </a:fld>
             <a:endParaRPr lang="en-US" dirty="0"/>
           </a:p>
@@ -5502,7 +5556,15 @@
             <p:ph type="ftr" sz="quarter" idx="11"/>
           </p:nvPr>
         </p:nvSpPr>
-        <p:spPr/>
+        <p:spPr>
+          <a:xfrm>
+            <a:off x="4038600" y="6356350"/>
+            <a:ext cx="4114800" cy="365125"/>
+          </a:xfrm>
+          <a:prstGeom prst="rect">
+            <a:avLst/>
+          </a:prstGeom>
+        </p:spPr>
         <p:txBody>
           <a:bodyPr/>
           <a:lstStyle/>
@@ -5521,7 +5583,15 @@
             <p:ph type="sldNum" sz="quarter" idx="12"/>
           </p:nvPr>
         </p:nvSpPr>
-        <p:spPr/>
+        <p:spPr>
+          <a:xfrm>
+            <a:off x="8385908" y="6356350"/>
+            <a:ext cx="1039446" cy="365125"/>
+          </a:xfrm>
+          <a:prstGeom prst="rect">
+            <a:avLst/>
+          </a:prstGeom>
+        </p:spPr>
         <p:txBody>
           <a:bodyPr/>
           <a:lstStyle/>
@@ -5574,14 +5644,22 @@
             <p:ph type="dt" sz="half" idx="10"/>
           </p:nvPr>
         </p:nvSpPr>
-        <p:spPr/>
+        <p:spPr>
+          <a:xfrm>
+            <a:off x="838200" y="6356350"/>
+            <a:ext cx="2743200" cy="365125"/>
+          </a:xfrm>
+          <a:prstGeom prst="rect">
+            <a:avLst/>
+          </a:prstGeom>
+        </p:spPr>
         <p:txBody>
           <a:bodyPr/>
           <a:lstStyle/>
           <a:p>
             <a:fld id="{C764DE79-268F-4C1A-8933-263129D2AF90}" type="datetimeFigureOut">
               <a:rPr lang="en-US" dirty="0"/>
-              <a:t>6/10/2017</a:t>
+              <a:t>6/11/2017</a:t>
             </a:fld>
             <a:endParaRPr lang="en-US" dirty="0"/>
           </a:p>
@@ -5597,7 +5675,15 @@
             <p:ph type="ftr" sz="quarter" idx="11"/>
           </p:nvPr>
         </p:nvSpPr>
-        <p:spPr/>
+        <p:spPr>
+          <a:xfrm>
+            <a:off x="4038600" y="6356350"/>
+            <a:ext cx="4114800" cy="365125"/>
+          </a:xfrm>
+          <a:prstGeom prst="rect">
+            <a:avLst/>
+          </a:prstGeom>
+        </p:spPr>
         <p:txBody>
           <a:bodyPr/>
           <a:lstStyle/>
@@ -5616,7 +5702,15 @@
             <p:ph type="sldNum" sz="quarter" idx="12"/>
           </p:nvPr>
         </p:nvSpPr>
-        <p:spPr/>
+        <p:spPr>
+          <a:xfrm>
+            <a:off x="8378092" y="6356350"/>
+            <a:ext cx="898770" cy="365125"/>
+          </a:xfrm>
+          <a:prstGeom prst="rect">
+            <a:avLst/>
+          </a:prstGeom>
+        </p:spPr>
         <p:txBody>
           <a:bodyPr/>
           <a:lstStyle/>
@@ -5851,14 +5945,22 @@
             <p:ph type="dt" sz="half" idx="10"/>
           </p:nvPr>
         </p:nvSpPr>
-        <p:spPr/>
+        <p:spPr>
+          <a:xfrm>
+            <a:off x="838200" y="6356350"/>
+            <a:ext cx="2743200" cy="365125"/>
+          </a:xfrm>
+          <a:prstGeom prst="rect">
+            <a:avLst/>
+          </a:prstGeom>
+        </p:spPr>
         <p:txBody>
           <a:bodyPr/>
           <a:lstStyle/>
           <a:p>
             <a:fld id="{C764DE79-268F-4C1A-8933-263129D2AF90}" type="datetimeFigureOut">
               <a:rPr lang="en-US" dirty="0"/>
-              <a:t>6/10/2017</a:t>
+              <a:t>6/11/2017</a:t>
             </a:fld>
             <a:endParaRPr lang="en-US" dirty="0"/>
           </a:p>
@@ -5874,7 +5976,15 @@
             <p:ph type="ftr" sz="quarter" idx="11"/>
           </p:nvPr>
         </p:nvSpPr>
-        <p:spPr/>
+        <p:spPr>
+          <a:xfrm>
+            <a:off x="4038600" y="6356350"/>
+            <a:ext cx="4114800" cy="365125"/>
+          </a:xfrm>
+          <a:prstGeom prst="rect">
+            <a:avLst/>
+          </a:prstGeom>
+        </p:spPr>
         <p:txBody>
           <a:bodyPr/>
           <a:lstStyle/>
@@ -5893,7 +6003,15 @@
             <p:ph type="sldNum" sz="quarter" idx="12"/>
           </p:nvPr>
         </p:nvSpPr>
-        <p:spPr/>
+        <p:spPr>
+          <a:xfrm>
+            <a:off x="8610600" y="6356350"/>
+            <a:ext cx="775677" cy="365125"/>
+          </a:xfrm>
+          <a:prstGeom prst="rect">
+            <a:avLst/>
+          </a:prstGeom>
+        </p:spPr>
         <p:txBody>
           <a:bodyPr/>
           <a:lstStyle/>
@@ -6108,14 +6226,22 @@
             <p:ph type="dt" sz="half" idx="10"/>
           </p:nvPr>
         </p:nvSpPr>
-        <p:spPr/>
+        <p:spPr>
+          <a:xfrm>
+            <a:off x="838200" y="6356350"/>
+            <a:ext cx="2743200" cy="365125"/>
+          </a:xfrm>
+          <a:prstGeom prst="rect">
+            <a:avLst/>
+          </a:prstGeom>
+        </p:spPr>
         <p:txBody>
           <a:bodyPr/>
           <a:lstStyle/>
           <a:p>
             <a:fld id="{C764DE79-268F-4C1A-8933-263129D2AF90}" type="datetimeFigureOut">
               <a:rPr lang="en-US" dirty="0"/>
-              <a:t>6/10/2017</a:t>
+              <a:t>6/11/2017</a:t>
             </a:fld>
             <a:endParaRPr lang="en-US" dirty="0"/>
           </a:p>
@@ -6131,7 +6257,15 @@
             <p:ph type="ftr" sz="quarter" idx="11"/>
           </p:nvPr>
         </p:nvSpPr>
-        <p:spPr/>
+        <p:spPr>
+          <a:xfrm>
+            <a:off x="4038600" y="6356350"/>
+            <a:ext cx="4114800" cy="365125"/>
+          </a:xfrm>
+          <a:prstGeom prst="rect">
+            <a:avLst/>
+          </a:prstGeom>
+        </p:spPr>
         <p:txBody>
           <a:bodyPr/>
           <a:lstStyle/>
@@ -6150,7 +6284,15 @@
             <p:ph type="sldNum" sz="quarter" idx="12"/>
           </p:nvPr>
         </p:nvSpPr>
-        <p:spPr/>
+        <p:spPr>
+          <a:xfrm>
+            <a:off x="8487508" y="6356350"/>
+            <a:ext cx="812800" cy="365125"/>
+          </a:xfrm>
+          <a:prstGeom prst="rect">
+            <a:avLst/>
+          </a:prstGeom>
+        </p:spPr>
         <p:txBody>
           <a:bodyPr/>
           <a:lstStyle/>
@@ -6278,14 +6420,22 @@
             <p:ph type="dt" sz="half" idx="10"/>
           </p:nvPr>
         </p:nvSpPr>
-        <p:spPr/>
+        <p:spPr>
+          <a:xfrm>
+            <a:off x="838200" y="6356350"/>
+            <a:ext cx="2743200" cy="365125"/>
+          </a:xfrm>
+          <a:prstGeom prst="rect">
+            <a:avLst/>
+          </a:prstGeom>
+        </p:spPr>
         <p:txBody>
           <a:bodyPr/>
           <a:lstStyle/>
           <a:p>
             <a:fld id="{C764DE79-268F-4C1A-8933-263129D2AF90}" type="datetimeFigureOut">
               <a:rPr lang="en-US" dirty="0"/>
-              <a:t>6/10/2017</a:t>
+              <a:t>6/11/2017</a:t>
             </a:fld>
             <a:endParaRPr lang="en-US" dirty="0"/>
           </a:p>
@@ -6301,7 +6451,15 @@
             <p:ph type="ftr" sz="quarter" idx="11"/>
           </p:nvPr>
         </p:nvSpPr>
-        <p:spPr/>
+        <p:spPr>
+          <a:xfrm>
+            <a:off x="4038600" y="6356350"/>
+            <a:ext cx="4114800" cy="365125"/>
+          </a:xfrm>
+          <a:prstGeom prst="rect">
+            <a:avLst/>
+          </a:prstGeom>
+        </p:spPr>
         <p:txBody>
           <a:bodyPr/>
           <a:lstStyle/>
@@ -6320,7 +6478,15 @@
             <p:ph type="sldNum" sz="quarter" idx="12"/>
           </p:nvPr>
         </p:nvSpPr>
-        <p:spPr/>
+        <p:spPr>
+          <a:xfrm>
+            <a:off x="8610600" y="6356350"/>
+            <a:ext cx="2743200" cy="365125"/>
+          </a:xfrm>
+          <a:prstGeom prst="rect">
+            <a:avLst/>
+          </a:prstGeom>
+        </p:spPr>
         <p:txBody>
           <a:bodyPr/>
           <a:lstStyle/>
@@ -6458,14 +6624,22 @@
             <p:ph type="dt" sz="half" idx="10"/>
           </p:nvPr>
         </p:nvSpPr>
-        <p:spPr/>
+        <p:spPr>
+          <a:xfrm>
+            <a:off x="838200" y="6356350"/>
+            <a:ext cx="2743200" cy="365125"/>
+          </a:xfrm>
+          <a:prstGeom prst="rect">
+            <a:avLst/>
+          </a:prstGeom>
+        </p:spPr>
         <p:txBody>
           <a:bodyPr/>
           <a:lstStyle/>
           <a:p>
             <a:fld id="{C764DE79-268F-4C1A-8933-263129D2AF90}" type="datetimeFigureOut">
               <a:rPr lang="en-US" dirty="0"/>
-              <a:t>6/10/2017</a:t>
+              <a:t>6/11/2017</a:t>
             </a:fld>
             <a:endParaRPr lang="en-US" dirty="0"/>
           </a:p>
@@ -6481,7 +6655,15 @@
             <p:ph type="ftr" sz="quarter" idx="11"/>
           </p:nvPr>
         </p:nvSpPr>
-        <p:spPr/>
+        <p:spPr>
+          <a:xfrm>
+            <a:off x="4038600" y="6356350"/>
+            <a:ext cx="4114800" cy="365125"/>
+          </a:xfrm>
+          <a:prstGeom prst="rect">
+            <a:avLst/>
+          </a:prstGeom>
+        </p:spPr>
         <p:txBody>
           <a:bodyPr/>
           <a:lstStyle/>
@@ -6500,7 +6682,15 @@
             <p:ph type="sldNum" sz="quarter" idx="12"/>
           </p:nvPr>
         </p:nvSpPr>
-        <p:spPr/>
+        <p:spPr>
+          <a:xfrm>
+            <a:off x="8610600" y="6356350"/>
+            <a:ext cx="2743200" cy="365125"/>
+          </a:xfrm>
+          <a:prstGeom prst="rect">
+            <a:avLst/>
+          </a:prstGeom>
+        </p:spPr>
         <p:txBody>
           <a:bodyPr/>
           <a:lstStyle/>
@@ -6929,6 +7119,45 @@
           <a:lstStyle/>
           <a:p>
             <a:endParaRPr lang="en-US" sz="1765"/>
+          </a:p>
+        </p:txBody>
+      </p:sp>
+      <p:sp>
+        <p:nvSpPr>
+          <p:cNvPr id="14" name="TextBox 13">
+            <a:extLst>
+              <a:ext uri="{FF2B5EF4-FFF2-40B4-BE49-F238E27FC236}">
+                <a16:creationId xmlns:a16="http://schemas.microsoft.com/office/drawing/2014/main" id="{DF8147B9-0221-49EB-9B78-112DC1A4CD88}"/>
+              </a:ext>
+            </a:extLst>
+          </p:cNvPr>
+          <p:cNvSpPr txBox="1"/>
+          <p:nvPr userDrawn="1"/>
+        </p:nvSpPr>
+        <p:spPr>
+          <a:xfrm>
+            <a:off x="9355015" y="6377353"/>
+            <a:ext cx="2782277" cy="369332"/>
+          </a:xfrm>
+          <a:prstGeom prst="rect">
+            <a:avLst/>
+          </a:prstGeom>
+          <a:noFill/>
+        </p:spPr>
+        <p:txBody>
+          <a:bodyPr wrap="square" rtlCol="0">
+            <a:spAutoFit/>
+          </a:bodyPr>
+          <a:lstStyle/>
+          <a:p>
+            <a:r>
+              <a:rPr lang="en-US" sz="1000" dirty="0"/>
+              <a:t>Socialize: </a:t>
+            </a:r>
+            <a:r>
+              <a:rPr lang="en-US" dirty="0"/>
+              <a:t>#70-534 @ITProGuru</a:t>
+            </a:r>
           </a:p>
         </p:txBody>
       </p:sp>
@@ -7576,8 +7805,16 @@
 </file>
 
 <file path=ppt/slideLayouts/slideLayout2.xml><?xml version="1.0" encoding="utf-8"?>
-<p:sldLayout xmlns:a="http://schemas.openxmlformats.org/drawingml/2006/main" xmlns:r="http://schemas.openxmlformats.org/officeDocument/2006/relationships" xmlns:p="http://schemas.openxmlformats.org/presentationml/2006/main" type="obj" preserve="1">
-  <p:cSld name="2_Title and Content">
+<p:sldLayout xmlns:a="http://schemas.openxmlformats.org/drawingml/2006/main" xmlns:r="http://schemas.openxmlformats.org/officeDocument/2006/relationships" xmlns:p="http://schemas.openxmlformats.org/presentationml/2006/main" preserve="1" userDrawn="1">
+  <p:cSld name="Exam Tip">
+    <p:bg>
+      <p:bgPr>
+        <a:solidFill>
+          <a:srgbClr val="92D050"/>
+        </a:solidFill>
+        <a:effectLst/>
+      </p:bgPr>
+    </p:bg>
     <p:spTree>
       <p:nvGrpSpPr>
         <p:cNvPr id="1" name=""/>
@@ -7604,36 +7841,8 @@
         </p:nvSpPr>
         <p:spPr>
           <a:xfrm>
-            <a:off x="201591" y="353551"/>
-            <a:ext cx="11778205" cy="878350"/>
-          </a:xfrm>
-        </p:spPr>
-        <p:txBody>
-          <a:bodyPr/>
-          <a:lstStyle/>
-          <a:p>
-            <a:r>
-              <a:rPr lang="en-US"/>
-              <a:t>Click to edit Master title style</a:t>
-            </a:r>
-            <a:endParaRPr lang="en-US" dirty="0"/>
-          </a:p>
-        </p:txBody>
-      </p:sp>
-      <p:sp>
-        <p:nvSpPr>
-          <p:cNvPr id="3" name="Content Placeholder 2"/>
-          <p:cNvSpPr>
-            <a:spLocks noGrp="1"/>
-          </p:cNvSpPr>
-          <p:nvPr>
-            <p:ph idx="1"/>
-          </p:nvPr>
-        </p:nvSpPr>
-        <p:spPr>
-          <a:xfrm>
-            <a:off x="201591" y="1231901"/>
-            <a:ext cx="11778205" cy="5423281"/>
+            <a:off x="3525520" y="347874"/>
+            <a:ext cx="8398400" cy="923330"/>
           </a:xfrm>
         </p:spPr>
         <p:txBody>
@@ -7641,37 +7850,187 @@
             <a:normAutofit/>
           </a:bodyPr>
           <a:lstStyle>
+            <a:lvl1pPr algn="l" defTabSz="914400" rtl="0" eaLnBrk="1" latinLnBrk="0" hangingPunct="1">
+              <a:lnSpc>
+                <a:spcPct val="90000"/>
+              </a:lnSpc>
+              <a:spcBef>
+                <a:spcPct val="0"/>
+              </a:spcBef>
+              <a:buNone/>
+              <a:defRPr lang="en-US" sz="5400" b="1" i="1" u="none" kern="1200" baseline="0" dirty="0">
+                <a:solidFill>
+                  <a:schemeClr val="tx1"/>
+                </a:solidFill>
+                <a:latin typeface="+mj-lt"/>
+                <a:ea typeface="+mj-ea"/>
+                <a:cs typeface="+mj-cs"/>
+              </a:defRPr>
+            </a:lvl1pPr>
+          </a:lstStyle>
+          <a:p>
+            <a:endParaRPr lang="en-US" dirty="0"/>
+          </a:p>
+        </p:txBody>
+      </p:sp>
+      <p:sp>
+        <p:nvSpPr>
+          <p:cNvPr id="4" name="Text Placeholder 3"/>
+          <p:cNvSpPr>
+            <a:spLocks noGrp="1"/>
+          </p:cNvSpPr>
+          <p:nvPr>
+            <p:ph type="body" sz="quarter" idx="11"/>
+          </p:nvPr>
+        </p:nvSpPr>
+        <p:spPr>
+          <a:xfrm>
+            <a:off x="268080" y="1271204"/>
+            <a:ext cx="11655840" cy="4641916"/>
+          </a:xfrm>
+        </p:spPr>
+        <p:txBody>
+          <a:bodyPr>
+            <a:noAutofit/>
+          </a:bodyPr>
+          <a:lstStyle>
+            <a:lvl1pPr marL="0" indent="0">
+              <a:buNone/>
+              <a:defRPr sz="4000"/>
+            </a:lvl1pPr>
+            <a:lvl2pPr marL="28012" indent="0">
+              <a:buNone/>
+              <a:defRPr sz="1961"/>
+            </a:lvl2pPr>
+            <a:lvl3pPr marL="219428" indent="0">
+              <a:buNone/>
+              <a:defRPr sz="1961"/>
+            </a:lvl3pPr>
+            <a:lvl4pPr marL="466868" indent="0">
+              <a:buNone/>
+              <a:defRPr sz="1765"/>
+            </a:lvl4pPr>
+            <a:lvl5pPr marL="725201" indent="0">
+              <a:buNone/>
+              <a:defRPr sz="1765"/>
+            </a:lvl5pPr>
+          </a:lstStyle>
+          <a:p>
+            <a:pPr lvl="0"/>
+            <a:endParaRPr lang="en-US" dirty="0"/>
+          </a:p>
+        </p:txBody>
+      </p:sp>
+      <p:sp>
+        <p:nvSpPr>
+          <p:cNvPr id="5" name="Rectangle 4"/>
+          <p:cNvSpPr/>
+          <p:nvPr userDrawn="1"/>
+        </p:nvSpPr>
+        <p:spPr>
+          <a:xfrm>
+            <a:off x="268080" y="347873"/>
+            <a:ext cx="3209533" cy="923330"/>
+          </a:xfrm>
+          <a:prstGeom prst="rect">
+            <a:avLst/>
+          </a:prstGeom>
+        </p:spPr>
+        <p:txBody>
+          <a:bodyPr wrap="none">
+            <a:spAutoFit/>
+          </a:bodyPr>
+          <a:lstStyle/>
+          <a:p>
+            <a:pPr algn="l"/>
+            <a:r>
+              <a:rPr lang="en-US" sz="5400" b="1" dirty="0"/>
+              <a:t>EXAM TIP!</a:t>
+            </a:r>
+          </a:p>
+        </p:txBody>
+      </p:sp>
+      <p:sp>
+        <p:nvSpPr>
+          <p:cNvPr id="6" name="Text Placeholder 4">
+            <a:extLst>
+              <a:ext uri="{FF2B5EF4-FFF2-40B4-BE49-F238E27FC236}">
+                <a16:creationId xmlns:a16="http://schemas.microsoft.com/office/drawing/2014/main" id="{380C91C6-C6AF-40A3-AE50-C2507708BECF}"/>
+              </a:ext>
+            </a:extLst>
+          </p:cNvPr>
+          <p:cNvSpPr>
+            <a:spLocks noGrp="1"/>
+          </p:cNvSpPr>
+          <p:nvPr>
+            <p:ph type="body" sz="quarter" idx="10" hasCustomPrompt="1"/>
+          </p:nvPr>
+        </p:nvSpPr>
+        <p:spPr>
+          <a:xfrm>
+            <a:off x="211139" y="5987143"/>
+            <a:ext cx="9709376" cy="823460"/>
+          </a:xfrm>
+          <a:solidFill>
+            <a:srgbClr val="92D050"/>
+          </a:solidFill>
+        </p:spPr>
+        <p:txBody>
+          <a:bodyPr>
+            <a:noAutofit/>
+          </a:bodyPr>
+          <a:lstStyle>
             <a:lvl1pPr marL="0" indent="0">
               <a:buFontTx/>
               <a:buNone/>
-              <a:defRPr sz="3600"/>
+              <a:defRPr sz="2000" u="sng">
+                <a:solidFill>
+                  <a:srgbClr val="0070C0"/>
+                </a:solidFill>
+              </a:defRPr>
             </a:lvl1pPr>
             <a:lvl2pPr marL="457200" indent="0">
               <a:buFontTx/>
               <a:buNone/>
-              <a:defRPr sz="3200"/>
+              <a:defRPr sz="2000" u="sng">
+                <a:solidFill>
+                  <a:srgbClr val="0070C0"/>
+                </a:solidFill>
+              </a:defRPr>
             </a:lvl2pPr>
             <a:lvl3pPr marL="914400" indent="0">
               <a:buFontTx/>
               <a:buNone/>
-              <a:defRPr sz="2800"/>
+              <a:defRPr sz="2000" u="sng">
+                <a:solidFill>
+                  <a:srgbClr val="0070C0"/>
+                </a:solidFill>
+              </a:defRPr>
             </a:lvl3pPr>
             <a:lvl4pPr marL="1371600" indent="0">
               <a:buFontTx/>
               <a:buNone/>
-              <a:defRPr sz="2400"/>
+              <a:defRPr sz="2000" u="sng">
+                <a:solidFill>
+                  <a:srgbClr val="0070C0"/>
+                </a:solidFill>
+              </a:defRPr>
             </a:lvl4pPr>
             <a:lvl5pPr marL="1828800" indent="0">
               <a:buFontTx/>
               <a:buNone/>
-              <a:defRPr sz="2400"/>
+              <a:defRPr sz="2000" u="sng">
+                <a:solidFill>
+                  <a:srgbClr val="0070C0"/>
+                </a:solidFill>
+              </a:defRPr>
             </a:lvl5pPr>
           </a:lstStyle>
           <a:p>
             <a:pPr lvl="0"/>
             <a:r>
               <a:rPr lang="en-US" dirty="0"/>
-              <a:t>Click to edit Master text styles</a:t>
+              <a:t>Edit Source URL</a:t>
             </a:r>
           </a:p>
           <a:p>
@@ -7707,13 +8066,16 @@
     </p:spTree>
     <p:extLst>
       <p:ext uri="{BB962C8B-B14F-4D97-AF65-F5344CB8AC3E}">
-        <p14:creationId xmlns:p14="http://schemas.microsoft.com/office/powerpoint/2010/main" val="3934432973"/>
+        <p14:creationId xmlns:p14="http://schemas.microsoft.com/office/powerpoint/2010/main" val="4115610489"/>
       </p:ext>
     </p:extLst>
   </p:cSld>
   <p:clrMapOvr>
     <a:masterClrMapping/>
   </p:clrMapOvr>
+  <p:transition>
+    <p:fade/>
+  </p:transition>
 </p:sldLayout>
 </file>
 
@@ -8438,168 +8800,6 @@
 </file>
 
 <file path=ppt/slideLayouts/slideLayout3.xml><?xml version="1.0" encoding="utf-8"?>
-<p:sldLayout xmlns:a="http://schemas.openxmlformats.org/drawingml/2006/main" xmlns:r="http://schemas.openxmlformats.org/officeDocument/2006/relationships" xmlns:p="http://schemas.openxmlformats.org/presentationml/2006/main" preserve="1" userDrawn="1">
-  <p:cSld name="Exam Tip">
-    <p:bg>
-      <p:bgPr>
-        <a:solidFill>
-          <a:srgbClr val="92D050"/>
-        </a:solidFill>
-        <a:effectLst/>
-      </p:bgPr>
-    </p:bg>
-    <p:spTree>
-      <p:nvGrpSpPr>
-        <p:cNvPr id="1" name=""/>
-        <p:cNvGrpSpPr/>
-        <p:nvPr/>
-      </p:nvGrpSpPr>
-      <p:grpSpPr>
-        <a:xfrm>
-          <a:off x="0" y="0"/>
-          <a:ext cx="0" cy="0"/>
-          <a:chOff x="0" y="0"/>
-          <a:chExt cx="0" cy="0"/>
-        </a:xfrm>
-      </p:grpSpPr>
-      <p:sp>
-        <p:nvSpPr>
-          <p:cNvPr id="2" name="Title 1"/>
-          <p:cNvSpPr>
-            <a:spLocks noGrp="1"/>
-          </p:cNvSpPr>
-          <p:nvPr>
-            <p:ph type="title"/>
-          </p:nvPr>
-        </p:nvSpPr>
-        <p:spPr>
-          <a:xfrm>
-            <a:off x="3525520" y="347874"/>
-            <a:ext cx="7259320" cy="923330"/>
-          </a:xfrm>
-        </p:spPr>
-        <p:txBody>
-          <a:bodyPr>
-            <a:normAutofit/>
-          </a:bodyPr>
-          <a:lstStyle>
-            <a:lvl1pPr algn="l" defTabSz="914400" rtl="0" eaLnBrk="1" latinLnBrk="0" hangingPunct="1">
-              <a:lnSpc>
-                <a:spcPct val="90000"/>
-              </a:lnSpc>
-              <a:spcBef>
-                <a:spcPct val="0"/>
-              </a:spcBef>
-              <a:buNone/>
-              <a:defRPr lang="en-US" sz="5400" b="1" i="1" u="none" kern="1200" baseline="0" dirty="0">
-                <a:solidFill>
-                  <a:schemeClr val="tx1"/>
-                </a:solidFill>
-                <a:latin typeface="+mj-lt"/>
-                <a:ea typeface="+mj-ea"/>
-                <a:cs typeface="+mj-cs"/>
-              </a:defRPr>
-            </a:lvl1pPr>
-          </a:lstStyle>
-          <a:p>
-            <a:endParaRPr lang="en-US" dirty="0"/>
-          </a:p>
-        </p:txBody>
-      </p:sp>
-      <p:sp>
-        <p:nvSpPr>
-          <p:cNvPr id="4" name="Text Placeholder 3"/>
-          <p:cNvSpPr>
-            <a:spLocks noGrp="1"/>
-          </p:cNvSpPr>
-          <p:nvPr>
-            <p:ph type="body" sz="quarter" idx="11"/>
-          </p:nvPr>
-        </p:nvSpPr>
-        <p:spPr>
-          <a:xfrm>
-            <a:off x="268080" y="1271204"/>
-            <a:ext cx="11655840" cy="4641916"/>
-          </a:xfrm>
-        </p:spPr>
-        <p:txBody>
-          <a:bodyPr>
-            <a:noAutofit/>
-          </a:bodyPr>
-          <a:lstStyle>
-            <a:lvl1pPr marL="0" indent="0">
-              <a:buNone/>
-              <a:defRPr sz="4000"/>
-            </a:lvl1pPr>
-            <a:lvl2pPr marL="28012" indent="0">
-              <a:buNone/>
-              <a:defRPr sz="1961"/>
-            </a:lvl2pPr>
-            <a:lvl3pPr marL="219428" indent="0">
-              <a:buNone/>
-              <a:defRPr sz="1961"/>
-            </a:lvl3pPr>
-            <a:lvl4pPr marL="466868" indent="0">
-              <a:buNone/>
-              <a:defRPr sz="1765"/>
-            </a:lvl4pPr>
-            <a:lvl5pPr marL="725201" indent="0">
-              <a:buNone/>
-              <a:defRPr sz="1765"/>
-            </a:lvl5pPr>
-          </a:lstStyle>
-          <a:p>
-            <a:pPr lvl="0"/>
-            <a:endParaRPr lang="en-US" dirty="0"/>
-          </a:p>
-        </p:txBody>
-      </p:sp>
-      <p:sp>
-        <p:nvSpPr>
-          <p:cNvPr id="5" name="Rectangle 4"/>
-          <p:cNvSpPr/>
-          <p:nvPr userDrawn="1"/>
-        </p:nvSpPr>
-        <p:spPr>
-          <a:xfrm>
-            <a:off x="268080" y="347873"/>
-            <a:ext cx="3209533" cy="923330"/>
-          </a:xfrm>
-          <a:prstGeom prst="rect">
-            <a:avLst/>
-          </a:prstGeom>
-        </p:spPr>
-        <p:txBody>
-          <a:bodyPr wrap="none">
-            <a:spAutoFit/>
-          </a:bodyPr>
-          <a:lstStyle/>
-          <a:p>
-            <a:pPr algn="l"/>
-            <a:r>
-              <a:rPr lang="en-US" sz="5400" b="1" dirty="0"/>
-              <a:t>EXAM TIP!</a:t>
-            </a:r>
-          </a:p>
-        </p:txBody>
-      </p:sp>
-    </p:spTree>
-    <p:extLst>
-      <p:ext uri="{BB962C8B-B14F-4D97-AF65-F5344CB8AC3E}">
-        <p14:creationId xmlns:p14="http://schemas.microsoft.com/office/powerpoint/2010/main" val="4115610489"/>
-      </p:ext>
-    </p:extLst>
-  </p:cSld>
-  <p:clrMapOvr>
-    <a:masterClrMapping/>
-  </p:clrMapOvr>
-  <p:transition>
-    <p:fade/>
-  </p:transition>
-</p:sldLayout>
-</file>
-
-<file path=ppt/slideLayouts/slideLayout4.xml><?xml version="1.0" encoding="utf-8"?>
 <p:sldLayout xmlns:a="http://schemas.openxmlformats.org/drawingml/2006/main" xmlns:r="http://schemas.openxmlformats.org/officeDocument/2006/relationships" xmlns:p="http://schemas.openxmlformats.org/presentationml/2006/main" preserve="1" userDrawn="1">
   <p:cSld name="Question &amp; Answer">
     <p:spTree>
@@ -9078,7 +9278,7 @@
 </p:sldLayout>
 </file>
 
-<file path=ppt/slideLayouts/slideLayout5.xml><?xml version="1.0" encoding="utf-8"?>
+<file path=ppt/slideLayouts/slideLayout4.xml><?xml version="1.0" encoding="utf-8"?>
 <p:sldLayout xmlns:a="http://schemas.openxmlformats.org/drawingml/2006/main" xmlns:r="http://schemas.openxmlformats.org/officeDocument/2006/relationships" xmlns:p="http://schemas.openxmlformats.org/presentationml/2006/main" preserve="1" userDrawn="1">
   <p:cSld name="Content &amp; Code">
     <p:spTree>
@@ -9399,10 +9599,191 @@
           </a:p>
         </p:txBody>
       </p:sp>
+      <p:sp>
+        <p:nvSpPr>
+          <p:cNvPr id="6" name="TextBox 5">
+            <a:extLst>
+              <a:ext uri="{FF2B5EF4-FFF2-40B4-BE49-F238E27FC236}">
+                <a16:creationId xmlns:a16="http://schemas.microsoft.com/office/drawing/2014/main" id="{0F190067-1F7C-4577-8376-D9481BC0FB11}"/>
+              </a:ext>
+            </a:extLst>
+          </p:cNvPr>
+          <p:cNvSpPr txBox="1"/>
+          <p:nvPr userDrawn="1"/>
+        </p:nvSpPr>
+        <p:spPr>
+          <a:xfrm>
+            <a:off x="9355015" y="6377353"/>
+            <a:ext cx="2782277" cy="369332"/>
+          </a:xfrm>
+          <a:prstGeom prst="rect">
+            <a:avLst/>
+          </a:prstGeom>
+          <a:noFill/>
+        </p:spPr>
+        <p:txBody>
+          <a:bodyPr wrap="square" rtlCol="0">
+            <a:spAutoFit/>
+          </a:bodyPr>
+          <a:lstStyle/>
+          <a:p>
+            <a:r>
+              <a:rPr lang="en-US" sz="1000" dirty="0"/>
+              <a:t>Socialize: </a:t>
+            </a:r>
+            <a:r>
+              <a:rPr lang="en-US" dirty="0"/>
+              <a:t>#70-534 @ITProGuru</a:t>
+            </a:r>
+          </a:p>
+        </p:txBody>
+      </p:sp>
     </p:spTree>
     <p:extLst>
       <p:ext uri="{BB962C8B-B14F-4D97-AF65-F5344CB8AC3E}">
         <p14:creationId xmlns:p14="http://schemas.microsoft.com/office/powerpoint/2010/main" val="3879301324"/>
+      </p:ext>
+    </p:extLst>
+  </p:cSld>
+  <p:clrMapOvr>
+    <a:masterClrMapping/>
+  </p:clrMapOvr>
+</p:sldLayout>
+</file>
+
+<file path=ppt/slideLayouts/slideLayout5.xml><?xml version="1.0" encoding="utf-8"?>
+<p:sldLayout xmlns:a="http://schemas.openxmlformats.org/drawingml/2006/main" xmlns:r="http://schemas.openxmlformats.org/officeDocument/2006/relationships" xmlns:p="http://schemas.openxmlformats.org/presentationml/2006/main" type="obj" preserve="1">
+  <p:cSld name="2_Title and Content">
+    <p:spTree>
+      <p:nvGrpSpPr>
+        <p:cNvPr id="1" name=""/>
+        <p:cNvGrpSpPr/>
+        <p:nvPr/>
+      </p:nvGrpSpPr>
+      <p:grpSpPr>
+        <a:xfrm>
+          <a:off x="0" y="0"/>
+          <a:ext cx="0" cy="0"/>
+          <a:chOff x="0" y="0"/>
+          <a:chExt cx="0" cy="0"/>
+        </a:xfrm>
+      </p:grpSpPr>
+      <p:sp>
+        <p:nvSpPr>
+          <p:cNvPr id="2" name="Title 1"/>
+          <p:cNvSpPr>
+            <a:spLocks noGrp="1"/>
+          </p:cNvSpPr>
+          <p:nvPr>
+            <p:ph type="title"/>
+          </p:nvPr>
+        </p:nvSpPr>
+        <p:spPr>
+          <a:xfrm>
+            <a:off x="201591" y="353551"/>
+            <a:ext cx="11778205" cy="878350"/>
+          </a:xfrm>
+        </p:spPr>
+        <p:txBody>
+          <a:bodyPr/>
+          <a:lstStyle/>
+          <a:p>
+            <a:r>
+              <a:rPr lang="en-US"/>
+              <a:t>Click to edit Master title style</a:t>
+            </a:r>
+            <a:endParaRPr lang="en-US" dirty="0"/>
+          </a:p>
+        </p:txBody>
+      </p:sp>
+      <p:sp>
+        <p:nvSpPr>
+          <p:cNvPr id="3" name="Content Placeholder 2"/>
+          <p:cNvSpPr>
+            <a:spLocks noGrp="1"/>
+          </p:cNvSpPr>
+          <p:nvPr>
+            <p:ph idx="1"/>
+          </p:nvPr>
+        </p:nvSpPr>
+        <p:spPr>
+          <a:xfrm>
+            <a:off x="201591" y="1231901"/>
+            <a:ext cx="11778205" cy="5423281"/>
+          </a:xfrm>
+        </p:spPr>
+        <p:txBody>
+          <a:bodyPr>
+            <a:normAutofit/>
+          </a:bodyPr>
+          <a:lstStyle>
+            <a:lvl1pPr marL="0" indent="0">
+              <a:buFontTx/>
+              <a:buNone/>
+              <a:defRPr sz="3600"/>
+            </a:lvl1pPr>
+            <a:lvl2pPr marL="457200" indent="0">
+              <a:buFontTx/>
+              <a:buNone/>
+              <a:defRPr sz="3200"/>
+            </a:lvl2pPr>
+            <a:lvl3pPr marL="914400" indent="0">
+              <a:buFontTx/>
+              <a:buNone/>
+              <a:defRPr sz="2800"/>
+            </a:lvl3pPr>
+            <a:lvl4pPr marL="1371600" indent="0">
+              <a:buFontTx/>
+              <a:buNone/>
+              <a:defRPr sz="2400"/>
+            </a:lvl4pPr>
+            <a:lvl5pPr marL="1828800" indent="0">
+              <a:buFontTx/>
+              <a:buNone/>
+              <a:defRPr sz="2400"/>
+            </a:lvl5pPr>
+          </a:lstStyle>
+          <a:p>
+            <a:pPr lvl="0"/>
+            <a:r>
+              <a:rPr lang="en-US" dirty="0"/>
+              <a:t>Click to edit Master text styles</a:t>
+            </a:r>
+          </a:p>
+          <a:p>
+            <a:pPr lvl="1"/>
+            <a:r>
+              <a:rPr lang="en-US" dirty="0"/>
+              <a:t>Second level</a:t>
+            </a:r>
+          </a:p>
+          <a:p>
+            <a:pPr lvl="2"/>
+            <a:r>
+              <a:rPr lang="en-US" dirty="0"/>
+              <a:t>Third level</a:t>
+            </a:r>
+          </a:p>
+          <a:p>
+            <a:pPr lvl="3"/>
+            <a:r>
+              <a:rPr lang="en-US" dirty="0"/>
+              <a:t>Fourth level</a:t>
+            </a:r>
+          </a:p>
+          <a:p>
+            <a:pPr lvl="4"/>
+            <a:r>
+              <a:rPr lang="en-US" dirty="0"/>
+              <a:t>Fifth level</a:t>
+            </a:r>
+          </a:p>
+        </p:txBody>
+      </p:sp>
+    </p:spTree>
+    <p:extLst>
+      <p:ext uri="{BB962C8B-B14F-4D97-AF65-F5344CB8AC3E}">
+        <p14:creationId xmlns:p14="http://schemas.microsoft.com/office/powerpoint/2010/main" val="3934432973"/>
       </p:ext>
     </p:extLst>
   </p:cSld>
@@ -9551,14 +9932,22 @@
             <p:ph type="dt" sz="half" idx="10"/>
           </p:nvPr>
         </p:nvSpPr>
-        <p:spPr/>
+        <p:spPr>
+          <a:xfrm>
+            <a:off x="838200" y="6356350"/>
+            <a:ext cx="2743200" cy="365125"/>
+          </a:xfrm>
+          <a:prstGeom prst="rect">
+            <a:avLst/>
+          </a:prstGeom>
+        </p:spPr>
         <p:txBody>
           <a:bodyPr/>
           <a:lstStyle/>
           <a:p>
             <a:fld id="{C764DE79-268F-4C1A-8933-263129D2AF90}" type="datetimeFigureOut">
               <a:rPr lang="en-US" dirty="0"/>
-              <a:t>6/10/2017</a:t>
+              <a:t>6/11/2017</a:t>
             </a:fld>
             <a:endParaRPr lang="en-US" dirty="0"/>
           </a:p>
@@ -9574,7 +9963,15 @@
             <p:ph type="ftr" sz="quarter" idx="11"/>
           </p:nvPr>
         </p:nvSpPr>
-        <p:spPr/>
+        <p:spPr>
+          <a:xfrm>
+            <a:off x="4038600" y="6356350"/>
+            <a:ext cx="3737708" cy="365125"/>
+          </a:xfrm>
+          <a:prstGeom prst="rect">
+            <a:avLst/>
+          </a:prstGeom>
+        </p:spPr>
         <p:txBody>
           <a:bodyPr/>
           <a:lstStyle/>
@@ -9593,7 +9990,15 @@
             <p:ph type="sldNum" sz="quarter" idx="12"/>
           </p:nvPr>
         </p:nvSpPr>
-        <p:spPr/>
+        <p:spPr>
+          <a:xfrm>
+            <a:off x="7979508" y="6356350"/>
+            <a:ext cx="1352061" cy="365125"/>
+          </a:xfrm>
+          <a:prstGeom prst="rect">
+            <a:avLst/>
+          </a:prstGeom>
+        </p:spPr>
         <p:txBody>
           <a:bodyPr/>
           <a:lstStyle/>
@@ -9743,14 +10148,22 @@
             <p:ph type="dt" sz="half" idx="10"/>
           </p:nvPr>
         </p:nvSpPr>
-        <p:spPr/>
+        <p:spPr>
+          <a:xfrm>
+            <a:off x="838200" y="6356350"/>
+            <a:ext cx="2743200" cy="365125"/>
+          </a:xfrm>
+          <a:prstGeom prst="rect">
+            <a:avLst/>
+          </a:prstGeom>
+        </p:spPr>
         <p:txBody>
           <a:bodyPr/>
           <a:lstStyle/>
           <a:p>
             <a:fld id="{C764DE79-268F-4C1A-8933-263129D2AF90}" type="datetimeFigureOut">
               <a:rPr lang="en-US" dirty="0"/>
-              <a:t>6/10/2017</a:t>
+              <a:t>6/11/2017</a:t>
             </a:fld>
             <a:endParaRPr lang="en-US" dirty="0"/>
           </a:p>
@@ -9766,7 +10179,15 @@
             <p:ph type="ftr" sz="quarter" idx="11"/>
           </p:nvPr>
         </p:nvSpPr>
-        <p:spPr/>
+        <p:spPr>
+          <a:xfrm>
+            <a:off x="4038600" y="6356350"/>
+            <a:ext cx="3628292" cy="365125"/>
+          </a:xfrm>
+          <a:prstGeom prst="rect">
+            <a:avLst/>
+          </a:prstGeom>
+        </p:spPr>
         <p:txBody>
           <a:bodyPr/>
           <a:lstStyle/>
@@ -9785,7 +10206,15 @@
             <p:ph type="sldNum" sz="quarter" idx="12"/>
           </p:nvPr>
         </p:nvSpPr>
-        <p:spPr/>
+        <p:spPr>
+          <a:xfrm>
+            <a:off x="7844692" y="6356350"/>
+            <a:ext cx="1408723" cy="365125"/>
+          </a:xfrm>
+          <a:prstGeom prst="rect">
+            <a:avLst/>
+          </a:prstGeom>
+        </p:spPr>
         <p:txBody>
           <a:bodyPr/>
           <a:lstStyle/>
@@ -9995,14 +10424,22 @@
             <p:ph type="dt" sz="half" idx="10"/>
           </p:nvPr>
         </p:nvSpPr>
-        <p:spPr/>
+        <p:spPr>
+          <a:xfrm>
+            <a:off x="838200" y="6356350"/>
+            <a:ext cx="2743200" cy="365125"/>
+          </a:xfrm>
+          <a:prstGeom prst="rect">
+            <a:avLst/>
+          </a:prstGeom>
+        </p:spPr>
         <p:txBody>
           <a:bodyPr/>
           <a:lstStyle/>
           <a:p>
             <a:fld id="{C764DE79-268F-4C1A-8933-263129D2AF90}" type="datetimeFigureOut">
               <a:rPr lang="en-US" dirty="0"/>
-              <a:t>6/10/2017</a:t>
+              <a:t>6/11/2017</a:t>
             </a:fld>
             <a:endParaRPr lang="en-US" dirty="0"/>
           </a:p>
@@ -10018,7 +10455,15 @@
             <p:ph type="ftr" sz="quarter" idx="11"/>
           </p:nvPr>
         </p:nvSpPr>
-        <p:spPr/>
+        <p:spPr>
+          <a:xfrm>
+            <a:off x="4038600" y="6356350"/>
+            <a:ext cx="4114800" cy="365125"/>
+          </a:xfrm>
+          <a:prstGeom prst="rect">
+            <a:avLst/>
+          </a:prstGeom>
+        </p:spPr>
         <p:txBody>
           <a:bodyPr/>
           <a:lstStyle/>
@@ -10037,7 +10482,15 @@
             <p:ph type="sldNum" sz="quarter" idx="12"/>
           </p:nvPr>
         </p:nvSpPr>
-        <p:spPr/>
+        <p:spPr>
+          <a:xfrm>
+            <a:off x="8378092" y="6356350"/>
+            <a:ext cx="1031631" cy="365125"/>
+          </a:xfrm>
+          <a:prstGeom prst="rect">
+            <a:avLst/>
+          </a:prstGeom>
+        </p:spPr>
         <p:txBody>
           <a:bodyPr/>
           <a:lstStyle/>
@@ -10230,7 +10683,7 @@
 
 <file path=ppt/slideLayouts/slideLayout9.xml><?xml version="1.0" encoding="utf-8"?>
 <p:sldLayout xmlns:a="http://schemas.openxmlformats.org/drawingml/2006/main" xmlns:r="http://schemas.openxmlformats.org/officeDocument/2006/relationships" xmlns:p="http://schemas.openxmlformats.org/presentationml/2006/main" type="secHead" preserve="1">
-  <p:cSld name="1_Section Header">
+  <p:cSld name="Section Header or Tip">
     <p:bg>
       <p:bgPr>
         <a:solidFill>
@@ -10401,71 +10854,6 @@
               <a:rPr lang="en-US"/>
               <a:t>Click to edit Master text styles</a:t>
             </a:r>
-          </a:p>
-        </p:txBody>
-      </p:sp>
-      <p:sp>
-        <p:nvSpPr>
-          <p:cNvPr id="4" name="Date Placeholder 3"/>
-          <p:cNvSpPr>
-            <a:spLocks noGrp="1"/>
-          </p:cNvSpPr>
-          <p:nvPr>
-            <p:ph type="dt" sz="half" idx="10"/>
-          </p:nvPr>
-        </p:nvSpPr>
-        <p:spPr/>
-        <p:txBody>
-          <a:bodyPr/>
-          <a:lstStyle/>
-          <a:p>
-            <a:fld id="{C764DE79-268F-4C1A-8933-263129D2AF90}" type="datetimeFigureOut">
-              <a:rPr lang="en-US" dirty="0"/>
-              <a:t>6/10/2017</a:t>
-            </a:fld>
-            <a:endParaRPr lang="en-US" dirty="0"/>
-          </a:p>
-        </p:txBody>
-      </p:sp>
-      <p:sp>
-        <p:nvSpPr>
-          <p:cNvPr id="5" name="Footer Placeholder 4"/>
-          <p:cNvSpPr>
-            <a:spLocks noGrp="1"/>
-          </p:cNvSpPr>
-          <p:nvPr>
-            <p:ph type="ftr" sz="quarter" idx="11"/>
-          </p:nvPr>
-        </p:nvSpPr>
-        <p:spPr/>
-        <p:txBody>
-          <a:bodyPr/>
-          <a:lstStyle/>
-          <a:p>
-            <a:endParaRPr lang="en-US" dirty="0"/>
-          </a:p>
-        </p:txBody>
-      </p:sp>
-      <p:sp>
-        <p:nvSpPr>
-          <p:cNvPr id="6" name="Slide Number Placeholder 5"/>
-          <p:cNvSpPr>
-            <a:spLocks noGrp="1"/>
-          </p:cNvSpPr>
-          <p:nvPr>
-            <p:ph type="sldNum" sz="quarter" idx="12"/>
-          </p:nvPr>
-        </p:nvSpPr>
-        <p:spPr/>
-        <p:txBody>
-          <a:bodyPr/>
-          <a:lstStyle/>
-          <a:p>
-            <a:fld id="{48F63A3B-78C7-47BE-AE5E-E10140E04643}" type="slidenum">
-              <a:rPr lang="en-US" dirty="0"/>
-              <a:t>‹#›</a:t>
-            </a:fld>
-            <a:endParaRPr lang="en-US" dirty="0"/>
           </a:p>
         </p:txBody>
       </p:sp>
@@ -10516,8 +10904,8 @@
         </p:nvSpPr>
         <p:spPr>
           <a:xfrm>
-            <a:off x="838200" y="365125"/>
-            <a:ext cx="10515600" cy="1325563"/>
+            <a:off x="838200" y="226647"/>
+            <a:ext cx="10515600" cy="1195754"/>
           </a:xfrm>
           <a:prstGeom prst="rect">
             <a:avLst/>
@@ -10549,8 +10937,8 @@
         </p:nvSpPr>
         <p:spPr>
           <a:xfrm>
-            <a:off x="838200" y="1825625"/>
-            <a:ext cx="10515600" cy="4351338"/>
+            <a:off x="838200" y="1555262"/>
+            <a:ext cx="10515600" cy="4759569"/>
           </a:xfrm>
           <a:prstGeom prst="rect">
             <a:avLst/>
@@ -10601,120 +10989,40 @@
       </p:sp>
       <p:sp>
         <p:nvSpPr>
-          <p:cNvPr id="4" name="Date Placeholder 3"/>
-          <p:cNvSpPr>
-            <a:spLocks noGrp="1"/>
-          </p:cNvSpPr>
-          <p:nvPr>
-            <p:ph type="dt" sz="half" idx="2"/>
-          </p:nvPr>
+          <p:cNvPr id="7" name="TextBox 6">
+            <a:extLst>
+              <a:ext uri="{FF2B5EF4-FFF2-40B4-BE49-F238E27FC236}">
+                <a16:creationId xmlns:a16="http://schemas.microsoft.com/office/drawing/2014/main" id="{F0568AA2-4C6B-4DE7-A5F1-F06FF39C7CAA}"/>
+              </a:ext>
+            </a:extLst>
+          </p:cNvPr>
+          <p:cNvSpPr txBox="1"/>
+          <p:nvPr userDrawn="1"/>
         </p:nvSpPr>
         <p:spPr>
           <a:xfrm>
-            <a:off x="838200" y="6356350"/>
-            <a:ext cx="2743200" cy="365125"/>
+            <a:off x="9355015" y="6377353"/>
+            <a:ext cx="2782277" cy="369332"/>
           </a:xfrm>
           <a:prstGeom prst="rect">
             <a:avLst/>
           </a:prstGeom>
+          <a:noFill/>
         </p:spPr>
         <p:txBody>
-          <a:bodyPr vert="horz" lIns="91440" tIns="45720" rIns="91440" bIns="45720" rtlCol="0" anchor="ctr"/>
-          <a:lstStyle>
-            <a:lvl1pPr algn="l">
-              <a:defRPr sz="1200">
-                <a:solidFill>
-                  <a:schemeClr val="tx1">
-                    <a:tint val="75000"/>
-                  </a:schemeClr>
-                </a:solidFill>
-              </a:defRPr>
-            </a:lvl1pPr>
-          </a:lstStyle>
-          <a:p>
-            <a:fld id="{C764DE79-268F-4C1A-8933-263129D2AF90}" type="datetimeFigureOut">
+          <a:bodyPr wrap="square" rtlCol="0">
+            <a:spAutoFit/>
+          </a:bodyPr>
+          <a:lstStyle/>
+          <a:p>
+            <a:r>
+              <a:rPr lang="en-US" sz="1000" dirty="0"/>
+              <a:t>Socialize: </a:t>
+            </a:r>
+            <a:r>
               <a:rPr lang="en-US" dirty="0"/>
-              <a:t>6/10/2017</a:t>
-            </a:fld>
-            <a:endParaRPr lang="en-US" dirty="0"/>
-          </a:p>
-        </p:txBody>
-      </p:sp>
-      <p:sp>
-        <p:nvSpPr>
-          <p:cNvPr id="5" name="Footer Placeholder 4"/>
-          <p:cNvSpPr>
-            <a:spLocks noGrp="1"/>
-          </p:cNvSpPr>
-          <p:nvPr>
-            <p:ph type="ftr" sz="quarter" idx="3"/>
-          </p:nvPr>
-        </p:nvSpPr>
-        <p:spPr>
-          <a:xfrm>
-            <a:off x="4038600" y="6356350"/>
-            <a:ext cx="4114800" cy="365125"/>
-          </a:xfrm>
-          <a:prstGeom prst="rect">
-            <a:avLst/>
-          </a:prstGeom>
-        </p:spPr>
-        <p:txBody>
-          <a:bodyPr vert="horz" lIns="91440" tIns="45720" rIns="91440" bIns="45720" rtlCol="0" anchor="ctr"/>
-          <a:lstStyle>
-            <a:lvl1pPr algn="ctr">
-              <a:defRPr sz="1200">
-                <a:solidFill>
-                  <a:schemeClr val="tx1">
-                    <a:tint val="75000"/>
-                  </a:schemeClr>
-                </a:solidFill>
-              </a:defRPr>
-            </a:lvl1pPr>
-          </a:lstStyle>
-          <a:p>
-            <a:endParaRPr lang="en-US" dirty="0"/>
-          </a:p>
-        </p:txBody>
-      </p:sp>
-      <p:sp>
-        <p:nvSpPr>
-          <p:cNvPr id="6" name="Slide Number Placeholder 5"/>
-          <p:cNvSpPr>
-            <a:spLocks noGrp="1"/>
-          </p:cNvSpPr>
-          <p:nvPr>
-            <p:ph type="sldNum" sz="quarter" idx="4"/>
-          </p:nvPr>
-        </p:nvSpPr>
-        <p:spPr>
-          <a:xfrm>
-            <a:off x="8610600" y="6356350"/>
-            <a:ext cx="2743200" cy="365125"/>
-          </a:xfrm>
-          <a:prstGeom prst="rect">
-            <a:avLst/>
-          </a:prstGeom>
-        </p:spPr>
-        <p:txBody>
-          <a:bodyPr vert="horz" lIns="91440" tIns="45720" rIns="91440" bIns="45720" rtlCol="0" anchor="ctr"/>
-          <a:lstStyle>
-            <a:lvl1pPr algn="r">
-              <a:defRPr sz="1200">
-                <a:solidFill>
-                  <a:schemeClr val="tx1">
-                    <a:tint val="75000"/>
-                  </a:schemeClr>
-                </a:solidFill>
-              </a:defRPr>
-            </a:lvl1pPr>
-          </a:lstStyle>
-          <a:p>
-            <a:fld id="{48F63A3B-78C7-47BE-AE5E-E10140E04643}" type="slidenum">
-              <a:rPr lang="en-US" dirty="0"/>
-              <a:t>‹#›</a:t>
-            </a:fld>
-            <a:endParaRPr lang="en-US" dirty="0"/>
+              <a:t>#70-534 @ITProGuru</a:t>
+            </a:r>
           </a:p>
         </p:txBody>
       </p:sp>
@@ -10728,10 +11036,10 @@
   <p:clrMap bg1="lt1" tx1="dk1" bg2="lt2" tx2="dk2" accent1="accent1" accent2="accent2" accent3="accent3" accent4="accent4" accent5="accent5" accent6="accent6" hlink="hlink" folHlink="folHlink"/>
   <p:sldLayoutIdLst>
     <p:sldLayoutId id="2147483686" r:id="rId1"/>
-    <p:sldLayoutId id="2147483687" r:id="rId2"/>
-    <p:sldLayoutId id="2147483688" r:id="rId3"/>
-    <p:sldLayoutId id="2147483662" r:id="rId4"/>
-    <p:sldLayoutId id="2147483684" r:id="rId5"/>
+    <p:sldLayoutId id="2147483688" r:id="rId2"/>
+    <p:sldLayoutId id="2147483662" r:id="rId3"/>
+    <p:sldLayoutId id="2147483684" r:id="rId4"/>
+    <p:sldLayoutId id="2147483687" r:id="rId5"/>
     <p:sldLayoutId id="2147483663" r:id="rId6"/>
     <p:sldLayoutId id="2147483664" r:id="rId7"/>
     <p:sldLayoutId id="2147483665" r:id="rId8"/>
@@ -12195,8 +12503,8 @@
         </p:nvSpPr>
         <p:spPr>
           <a:xfrm>
-            <a:off x="913631" y="6193488"/>
-            <a:ext cx="10628807" cy="584775"/>
+            <a:off x="398232" y="6142652"/>
+            <a:ext cx="9322873" cy="523220"/>
           </a:xfrm>
           <a:prstGeom prst="rect">
             <a:avLst/>
@@ -12226,7 +12534,7 @@
               <a:defRPr/>
             </a:pPr>
             <a:r>
-              <a:rPr kumimoji="0" lang="en-US" sz="3200" b="0" i="0" u="none" strike="noStrike" kern="1200" cap="none" spc="0" normalizeH="0" baseline="0" noProof="0" dirty="0">
+              <a:rPr kumimoji="0" lang="en-US" sz="2800" b="0" i="0" u="none" strike="noStrike" kern="1200" cap="none" spc="0" normalizeH="0" baseline="0" noProof="0" dirty="0">
                 <a:ln>
                   <a:noFill/>
                 </a:ln>
@@ -12277,10 +12585,10 @@
       </p:grpSpPr>
       <p:sp>
         <p:nvSpPr>
-          <p:cNvPr id="2" name="Title 1">
+          <p:cNvPr id="4" name="Title 3">
             <a:extLst>
               <a:ext uri="{FF2B5EF4-FFF2-40B4-BE49-F238E27FC236}">
-                <a16:creationId xmlns:a16="http://schemas.microsoft.com/office/drawing/2014/main" id="{DCECBB78-B0AA-4254-8E86-9443F269DED9}"/>
+                <a16:creationId xmlns:a16="http://schemas.microsoft.com/office/drawing/2014/main" id="{88A85678-0A16-4C89-AD26-5F8AA158F122}"/>
               </a:ext>
             </a:extLst>
           </p:cNvPr>
@@ -12302,10 +12610,10 @@
       </p:sp>
       <p:sp>
         <p:nvSpPr>
-          <p:cNvPr id="3" name="Content Placeholder 2">
+          <p:cNvPr id="5" name="Content Placeholder 4">
             <a:extLst>
               <a:ext uri="{FF2B5EF4-FFF2-40B4-BE49-F238E27FC236}">
-                <a16:creationId xmlns:a16="http://schemas.microsoft.com/office/drawing/2014/main" id="{EB011E80-81A1-4F81-B30E-C593FC86214B}"/>
+                <a16:creationId xmlns:a16="http://schemas.microsoft.com/office/drawing/2014/main" id="{F84B266A-64D5-4D6E-9556-029CC1DD310F}"/>
               </a:ext>
             </a:extLst>
           </p:cNvPr>
@@ -12314,6 +12622,31 @@
           </p:cNvSpPr>
           <p:nvPr>
             <p:ph idx="1"/>
+          </p:nvPr>
+        </p:nvSpPr>
+        <p:spPr/>
+        <p:txBody>
+          <a:bodyPr/>
+          <a:lstStyle/>
+          <a:p>
+            <a:endParaRPr lang="en-US"/>
+          </a:p>
+        </p:txBody>
+      </p:sp>
+      <p:sp>
+        <p:nvSpPr>
+          <p:cNvPr id="6" name="Text Placeholder 5">
+            <a:extLst>
+              <a:ext uri="{FF2B5EF4-FFF2-40B4-BE49-F238E27FC236}">
+                <a16:creationId xmlns:a16="http://schemas.microsoft.com/office/drawing/2014/main" id="{D00B3B4E-3472-4CBF-A3EB-C2047EA11A06}"/>
+              </a:ext>
+            </a:extLst>
+          </p:cNvPr>
+          <p:cNvSpPr>
+            <a:spLocks noGrp="1"/>
+          </p:cNvSpPr>
+          <p:nvPr>
+            <p:ph type="body" sz="quarter" idx="10"/>
           </p:nvPr>
         </p:nvSpPr>
         <p:spPr/>
@@ -12357,10 +12690,10 @@
       </p:grpSpPr>
       <p:sp>
         <p:nvSpPr>
-          <p:cNvPr id="2" name="Title 1">
+          <p:cNvPr id="4" name="Title 3">
             <a:extLst>
               <a:ext uri="{FF2B5EF4-FFF2-40B4-BE49-F238E27FC236}">
-                <a16:creationId xmlns:a16="http://schemas.microsoft.com/office/drawing/2014/main" id="{E242B39E-BC27-48DB-A61A-4F0A26FF72C2}"/>
+                <a16:creationId xmlns:a16="http://schemas.microsoft.com/office/drawing/2014/main" id="{DFC708C8-D05C-45C6-97A8-0AA4D5996669}"/>
               </a:ext>
             </a:extLst>
           </p:cNvPr>
@@ -12382,10 +12715,10 @@
       </p:sp>
       <p:sp>
         <p:nvSpPr>
-          <p:cNvPr id="3" name="Text Placeholder 2">
+          <p:cNvPr id="6" name="Text Placeholder 5">
             <a:extLst>
               <a:ext uri="{FF2B5EF4-FFF2-40B4-BE49-F238E27FC236}">
-                <a16:creationId xmlns:a16="http://schemas.microsoft.com/office/drawing/2014/main" id="{DD2B2B34-55A7-41DB-A1D1-620B6CB74D1E}"/>
+                <a16:creationId xmlns:a16="http://schemas.microsoft.com/office/drawing/2014/main" id="{D3862304-7FFC-46B8-B9A0-10F0010AB3AA}"/>
               </a:ext>
             </a:extLst>
           </p:cNvPr>
@@ -12394,6 +12727,31 @@
           </p:cNvSpPr>
           <p:nvPr>
             <p:ph type="body" sz="quarter" idx="11"/>
+          </p:nvPr>
+        </p:nvSpPr>
+        <p:spPr/>
+        <p:txBody>
+          <a:bodyPr/>
+          <a:lstStyle/>
+          <a:p>
+            <a:endParaRPr lang="en-US"/>
+          </a:p>
+        </p:txBody>
+      </p:sp>
+      <p:sp>
+        <p:nvSpPr>
+          <p:cNvPr id="5" name="Text Placeholder 4">
+            <a:extLst>
+              <a:ext uri="{FF2B5EF4-FFF2-40B4-BE49-F238E27FC236}">
+                <a16:creationId xmlns:a16="http://schemas.microsoft.com/office/drawing/2014/main" id="{4DBAC44B-3FC9-4D23-A06E-22105B31FC9E}"/>
+              </a:ext>
+            </a:extLst>
+          </p:cNvPr>
+          <p:cNvSpPr>
+            <a:spLocks noGrp="1"/>
+          </p:cNvSpPr>
+          <p:nvPr>
+            <p:ph type="body" sz="quarter" idx="10"/>
           </p:nvPr>
         </p:nvSpPr>
         <p:spPr/>
@@ -12459,7 +12817,7 @@
           <a:bodyPr/>
           <a:lstStyle/>
           <a:p>
-            <a:endParaRPr lang="en-US"/>
+            <a:endParaRPr lang="en-US" dirty="0"/>
           </a:p>
         </p:txBody>
       </p:sp>
@@ -15929,7 +16287,7 @@
   <a:extraClrSchemeLst/>
   <a:extLst>
     <a:ext uri="{05A4C25C-085E-4340-85A3-A5531E510DB2}">
-      <thm15:themeFamily xmlns:thm15="http://schemas.microsoft.com/office/thememl/2012/main" name="70-534-Template.pptx" id="{579BE080-85FA-46B1-A707-23A80C39764F}" vid="{1B0A586F-B624-4E78-8ACA-025DEC3AA0B0}"/>
+      <thm15:themeFamily xmlns:thm15="http://schemas.microsoft.com/office/thememl/2012/main" name="70-534-Template.potx" id="{25FFEE14-BE9B-46B5-90FF-019D890D3672}" vid="{6AB25E5C-3AEB-494E-86C0-9659E7189440}"/>
     </a:ext>
   </a:extLst>
 </a:theme>

</xml_diff>